<commit_message>
add Nacos cluster note
</commit_message>
<xml_diff>
--- a/SpringCloud笔记/课程截图.pptx
+++ b/SpringCloud笔记/课程截图.pptx
@@ -14,6 +14,7 @@
     <p:sldId id="262" r:id="rId8"/>
     <p:sldId id="263" r:id="rId9"/>
     <p:sldId id="264" r:id="rId10"/>
+    <p:sldId id="265" r:id="rId11"/>
   </p:sldIdLst>
   <p:sldSz cx="9144000" cy="6858000" type="screen4x3"/>
   <p:notesSz cx="6858000" cy="9144000"/>
@@ -296,7 +297,7 @@
           <a:p>
             <a:fld id="{530820CF-B880-4189-942D-D702A7CBA730}" type="datetimeFigureOut">
               <a:rPr lang="zh-CN" altLang="en-US" smtClean="0"/>
-              <a:t>2022/8/16</a:t>
+              <a:t>2022/8/24</a:t>
             </a:fld>
             <a:endParaRPr lang="zh-CN" altLang="en-US"/>
           </a:p>
@@ -461,7 +462,7 @@
           <a:p>
             <a:fld id="{530820CF-B880-4189-942D-D702A7CBA730}" type="datetimeFigureOut">
               <a:rPr lang="zh-CN" altLang="en-US" smtClean="0"/>
-              <a:t>2022/8/16</a:t>
+              <a:t>2022/8/24</a:t>
             </a:fld>
             <a:endParaRPr lang="zh-CN" altLang="en-US"/>
           </a:p>
@@ -636,7 +637,7 @@
           <a:p>
             <a:fld id="{530820CF-B880-4189-942D-D702A7CBA730}" type="datetimeFigureOut">
               <a:rPr lang="zh-CN" altLang="en-US" smtClean="0"/>
-              <a:t>2022/8/16</a:t>
+              <a:t>2022/8/24</a:t>
             </a:fld>
             <a:endParaRPr lang="zh-CN" altLang="en-US"/>
           </a:p>
@@ -801,7 +802,7 @@
           <a:p>
             <a:fld id="{530820CF-B880-4189-942D-D702A7CBA730}" type="datetimeFigureOut">
               <a:rPr lang="zh-CN" altLang="en-US" smtClean="0"/>
-              <a:t>2022/8/16</a:t>
+              <a:t>2022/8/24</a:t>
             </a:fld>
             <a:endParaRPr lang="zh-CN" altLang="en-US"/>
           </a:p>
@@ -1042,7 +1043,7 @@
           <a:p>
             <a:fld id="{530820CF-B880-4189-942D-D702A7CBA730}" type="datetimeFigureOut">
               <a:rPr lang="zh-CN" altLang="en-US" smtClean="0"/>
-              <a:t>2022/8/16</a:t>
+              <a:t>2022/8/24</a:t>
             </a:fld>
             <a:endParaRPr lang="zh-CN" altLang="en-US"/>
           </a:p>
@@ -1325,7 +1326,7 @@
           <a:p>
             <a:fld id="{530820CF-B880-4189-942D-D702A7CBA730}" type="datetimeFigureOut">
               <a:rPr lang="zh-CN" altLang="en-US" smtClean="0"/>
-              <a:t>2022/8/16</a:t>
+              <a:t>2022/8/24</a:t>
             </a:fld>
             <a:endParaRPr lang="zh-CN" altLang="en-US"/>
           </a:p>
@@ -1742,7 +1743,7 @@
           <a:p>
             <a:fld id="{530820CF-B880-4189-942D-D702A7CBA730}" type="datetimeFigureOut">
               <a:rPr lang="zh-CN" altLang="en-US" smtClean="0"/>
-              <a:t>2022/8/16</a:t>
+              <a:t>2022/8/24</a:t>
             </a:fld>
             <a:endParaRPr lang="zh-CN" altLang="en-US"/>
           </a:p>
@@ -1855,7 +1856,7 @@
           <a:p>
             <a:fld id="{530820CF-B880-4189-942D-D702A7CBA730}" type="datetimeFigureOut">
               <a:rPr lang="zh-CN" altLang="en-US" smtClean="0"/>
-              <a:t>2022/8/16</a:t>
+              <a:t>2022/8/24</a:t>
             </a:fld>
             <a:endParaRPr lang="zh-CN" altLang="en-US"/>
           </a:p>
@@ -1945,7 +1946,7 @@
           <a:p>
             <a:fld id="{530820CF-B880-4189-942D-D702A7CBA730}" type="datetimeFigureOut">
               <a:rPr lang="zh-CN" altLang="en-US" smtClean="0"/>
-              <a:t>2022/8/16</a:t>
+              <a:t>2022/8/24</a:t>
             </a:fld>
             <a:endParaRPr lang="zh-CN" altLang="en-US"/>
           </a:p>
@@ -2217,7 +2218,7 @@
           <a:p>
             <a:fld id="{530820CF-B880-4189-942D-D702A7CBA730}" type="datetimeFigureOut">
               <a:rPr lang="zh-CN" altLang="en-US" smtClean="0"/>
-              <a:t>2022/8/16</a:t>
+              <a:t>2022/8/24</a:t>
             </a:fld>
             <a:endParaRPr lang="zh-CN" altLang="en-US"/>
           </a:p>
@@ -2465,7 +2466,7 @@
           <a:p>
             <a:fld id="{530820CF-B880-4189-942D-D702A7CBA730}" type="datetimeFigureOut">
               <a:rPr lang="zh-CN" altLang="en-US" smtClean="0"/>
-              <a:t>2022/8/16</a:t>
+              <a:t>2022/8/24</a:t>
             </a:fld>
             <a:endParaRPr lang="zh-CN" altLang="en-US"/>
           </a:p>
@@ -2673,7 +2674,7 @@
           <a:p>
             <a:fld id="{530820CF-B880-4189-942D-D702A7CBA730}" type="datetimeFigureOut">
               <a:rPr lang="zh-CN" altLang="en-US" smtClean="0"/>
-              <a:t>2022/8/16</a:t>
+              <a:t>2022/8/24</a:t>
             </a:fld>
             <a:endParaRPr lang="zh-CN" altLang="en-US"/>
           </a:p>
@@ -3222,6 +3223,297 @@
 </p:sld>
 </file>
 
+<file path=ppt/slides/slide10.xml><?xml version="1.0" encoding="utf-8"?>
+<p:sld xmlns:a="http://schemas.openxmlformats.org/drawingml/2006/main" xmlns:r="http://schemas.openxmlformats.org/officeDocument/2006/relationships" xmlns:p="http://schemas.openxmlformats.org/presentationml/2006/main">
+  <p:cSld>
+    <p:spTree>
+      <p:nvGrpSpPr>
+        <p:cNvPr id="1" name=""/>
+        <p:cNvGrpSpPr/>
+        <p:nvPr/>
+      </p:nvGrpSpPr>
+      <p:grpSpPr>
+        <a:xfrm>
+          <a:off x="0" y="0"/>
+          <a:ext cx="0" cy="0"/>
+          <a:chOff x="0" y="0"/>
+          <a:chExt cx="0" cy="0"/>
+        </a:xfrm>
+      </p:grpSpPr>
+      <p:pic>
+        <p:nvPicPr>
+          <p:cNvPr id="1026" name="Picture 2"/>
+          <p:cNvPicPr>
+            <a:picLocks noChangeAspect="1" noChangeArrowheads="1"/>
+          </p:cNvPicPr>
+          <p:nvPr/>
+        </p:nvPicPr>
+        <p:blipFill>
+          <a:blip r:embed="rId2">
+            <a:extLst>
+              <a:ext uri="{28A0092B-C50C-407E-A947-70E740481C1C}">
+                <a14:useLocalDpi xmlns:a14="http://schemas.microsoft.com/office/drawing/2010/main" val="0"/>
+              </a:ext>
+            </a:extLst>
+          </a:blip>
+          <a:srcRect/>
+          <a:stretch>
+            <a:fillRect/>
+          </a:stretch>
+        </p:blipFill>
+        <p:spPr bwMode="auto">
+          <a:xfrm>
+            <a:off x="-35277" y="2924944"/>
+            <a:ext cx="8316416" cy="1578853"/>
+          </a:xfrm>
+          <a:prstGeom prst="rect">
+            <a:avLst/>
+          </a:prstGeom>
+          <a:noFill/>
+          <a:ln>
+            <a:noFill/>
+          </a:ln>
+          <a:effectLst/>
+          <a:extLst>
+            <a:ext uri="{909E8E84-426E-40DD-AFC4-6F175D3DCCD1}">
+              <a14:hiddenFill xmlns:a14="http://schemas.microsoft.com/office/drawing/2010/main">
+                <a:solidFill>
+                  <a:schemeClr val="accent1"/>
+                </a:solidFill>
+              </a14:hiddenFill>
+            </a:ext>
+            <a:ext uri="{91240B29-F687-4F45-9708-019B960494DF}">
+              <a14:hiddenLine xmlns:a14="http://schemas.microsoft.com/office/drawing/2010/main" w="9525">
+                <a:solidFill>
+                  <a:schemeClr val="tx1"/>
+                </a:solidFill>
+                <a:miter lim="800000"/>
+                <a:headEnd/>
+                <a:tailEnd/>
+              </a14:hiddenLine>
+            </a:ext>
+            <a:ext uri="{AF507438-7753-43E0-B8FC-AC1667EBCBE1}">
+              <a14:hiddenEffects xmlns:a14="http://schemas.microsoft.com/office/drawing/2010/main">
+                <a:effectLst>
+                  <a:outerShdw dist="35921" dir="2700000" algn="ctr" rotWithShape="0">
+                    <a:schemeClr val="bg2"/>
+                  </a:outerShdw>
+                </a:effectLst>
+              </a14:hiddenEffects>
+            </a:ext>
+          </a:extLst>
+        </p:spPr>
+      </p:pic>
+      <p:sp>
+        <p:nvSpPr>
+          <p:cNvPr id="4" name="TextBox 3"/>
+          <p:cNvSpPr txBox="1"/>
+          <p:nvPr/>
+        </p:nvSpPr>
+        <p:spPr>
+          <a:xfrm>
+            <a:off x="323528" y="116632"/>
+            <a:ext cx="3078792" cy="369332"/>
+          </a:xfrm>
+          <a:prstGeom prst="rect">
+            <a:avLst/>
+          </a:prstGeom>
+          <a:noFill/>
+        </p:spPr>
+        <p:txBody>
+          <a:bodyPr wrap="none" rtlCol="0">
+            <a:spAutoFit/>
+          </a:bodyPr>
+          <a:lstStyle/>
+          <a:p>
+            <a:r>
+              <a:rPr lang="en-US" altLang="zh-CN" smtClean="0"/>
+              <a:t>Nacos</a:t>
+            </a:r>
+            <a:r>
+              <a:rPr lang="zh-CN" altLang="en-US" smtClean="0"/>
+              <a:t>集群修改</a:t>
+            </a:r>
+            <a:r>
+              <a:rPr lang="en-US" altLang="zh-CN" smtClean="0"/>
+              <a:t>startup.sh</a:t>
+            </a:r>
+            <a:r>
+              <a:rPr lang="zh-CN" altLang="en-US" smtClean="0"/>
+              <a:t>脚本</a:t>
+            </a:r>
+            <a:endParaRPr lang="zh-CN" altLang="en-US"/>
+          </a:p>
+        </p:txBody>
+      </p:sp>
+      <p:pic>
+        <p:nvPicPr>
+          <p:cNvPr id="1027" name="Picture 3" descr="F:\Computer\SpringCloud\SpringCloud笔记\note-images\1661330507411.png"/>
+          <p:cNvPicPr>
+            <a:picLocks noChangeAspect="1" noChangeArrowheads="1"/>
+          </p:cNvPicPr>
+          <p:nvPr/>
+        </p:nvPicPr>
+        <p:blipFill>
+          <a:blip r:embed="rId3">
+            <a:extLst>
+              <a:ext uri="{28A0092B-C50C-407E-A947-70E740481C1C}">
+                <a14:useLocalDpi xmlns:a14="http://schemas.microsoft.com/office/drawing/2010/main" val="0"/>
+              </a:ext>
+            </a:extLst>
+          </a:blip>
+          <a:srcRect/>
+          <a:stretch>
+            <a:fillRect/>
+          </a:stretch>
+        </p:blipFill>
+        <p:spPr bwMode="auto">
+          <a:xfrm>
+            <a:off x="-3229" y="476282"/>
+            <a:ext cx="7455550" cy="2243676"/>
+          </a:xfrm>
+          <a:prstGeom prst="rect">
+            <a:avLst/>
+          </a:prstGeom>
+          <a:noFill/>
+          <a:extLst>
+            <a:ext uri="{909E8E84-426E-40DD-AFC4-6F175D3DCCD1}">
+              <a14:hiddenFill xmlns:a14="http://schemas.microsoft.com/office/drawing/2010/main">
+                <a:solidFill>
+                  <a:srgbClr val="FFFFFF"/>
+                </a:solidFill>
+              </a14:hiddenFill>
+            </a:ext>
+          </a:extLst>
+        </p:spPr>
+      </p:pic>
+      <p:pic>
+        <p:nvPicPr>
+          <p:cNvPr id="1028" name="Picture 4"/>
+          <p:cNvPicPr>
+            <a:picLocks noChangeAspect="1" noChangeArrowheads="1"/>
+          </p:cNvPicPr>
+          <p:nvPr/>
+        </p:nvPicPr>
+        <p:blipFill>
+          <a:blip r:embed="rId4">
+            <a:extLst>
+              <a:ext uri="{28A0092B-C50C-407E-A947-70E740481C1C}">
+                <a14:useLocalDpi xmlns:a14="http://schemas.microsoft.com/office/drawing/2010/main" val="0"/>
+              </a:ext>
+            </a:extLst>
+          </a:blip>
+          <a:srcRect/>
+          <a:stretch>
+            <a:fillRect/>
+          </a:stretch>
+        </p:blipFill>
+        <p:spPr bwMode="auto">
+          <a:xfrm>
+            <a:off x="-31720" y="5013176"/>
+            <a:ext cx="4619625" cy="3943350"/>
+          </a:xfrm>
+          <a:prstGeom prst="rect">
+            <a:avLst/>
+          </a:prstGeom>
+          <a:noFill/>
+          <a:ln>
+            <a:noFill/>
+          </a:ln>
+          <a:effectLst/>
+          <a:extLst>
+            <a:ext uri="{909E8E84-426E-40DD-AFC4-6F175D3DCCD1}">
+              <a14:hiddenFill xmlns:a14="http://schemas.microsoft.com/office/drawing/2010/main">
+                <a:solidFill>
+                  <a:schemeClr val="accent1"/>
+                </a:solidFill>
+              </a14:hiddenFill>
+            </a:ext>
+            <a:ext uri="{91240B29-F687-4F45-9708-019B960494DF}">
+              <a14:hiddenLine xmlns:a14="http://schemas.microsoft.com/office/drawing/2010/main" w="9525">
+                <a:solidFill>
+                  <a:schemeClr val="tx1"/>
+                </a:solidFill>
+                <a:miter lim="800000"/>
+                <a:headEnd/>
+                <a:tailEnd/>
+              </a14:hiddenLine>
+            </a:ext>
+            <a:ext uri="{AF507438-7753-43E0-B8FC-AC1667EBCBE1}">
+              <a14:hiddenEffects xmlns:a14="http://schemas.microsoft.com/office/drawing/2010/main">
+                <a:effectLst>
+                  <a:outerShdw dist="35921" dir="2700000" algn="ctr" rotWithShape="0">
+                    <a:schemeClr val="bg2"/>
+                  </a:outerShdw>
+                </a:effectLst>
+              </a14:hiddenEffects>
+            </a:ext>
+          </a:extLst>
+        </p:spPr>
+      </p:pic>
+      <p:sp>
+        <p:nvSpPr>
+          <p:cNvPr id="5" name="TextBox 4"/>
+          <p:cNvSpPr txBox="1"/>
+          <p:nvPr/>
+        </p:nvSpPr>
+        <p:spPr>
+          <a:xfrm>
+            <a:off x="107504" y="4544153"/>
+            <a:ext cx="4723537" cy="369332"/>
+          </a:xfrm>
+          <a:prstGeom prst="rect">
+            <a:avLst/>
+          </a:prstGeom>
+          <a:noFill/>
+        </p:spPr>
+        <p:txBody>
+          <a:bodyPr wrap="none" rtlCol="0">
+            <a:spAutoFit/>
+          </a:bodyPr>
+          <a:lstStyle/>
+          <a:p>
+            <a:r>
+              <a:rPr lang="en-US" altLang="zh-CN" smtClean="0"/>
+              <a:t>Nacos</a:t>
+            </a:r>
+            <a:r>
+              <a:rPr lang="zh-CN" altLang="en-US" smtClean="0"/>
+              <a:t>集群</a:t>
+            </a:r>
+            <a:r>
+              <a:rPr lang="en-US" altLang="zh-CN" smtClean="0"/>
+              <a:t>nginx</a:t>
+            </a:r>
+            <a:r>
+              <a:rPr lang="zh-CN" altLang="en-US" smtClean="0"/>
+              <a:t>负载均衡配置，监听</a:t>
+            </a:r>
+            <a:r>
+              <a:rPr lang="en-US" altLang="zh-CN" smtClean="0"/>
+              <a:t>1111</a:t>
+            </a:r>
+            <a:r>
+              <a:rPr lang="zh-CN" altLang="en-US" smtClean="0"/>
+              <a:t>端口</a:t>
+            </a:r>
+            <a:endParaRPr lang="zh-CN" altLang="en-US"/>
+          </a:p>
+        </p:txBody>
+      </p:sp>
+    </p:spTree>
+    <p:extLst>
+      <p:ext uri="{BB962C8B-B14F-4D97-AF65-F5344CB8AC3E}">
+        <p14:creationId xmlns:p14="http://schemas.microsoft.com/office/powerpoint/2010/main" val="3367927595"/>
+      </p:ext>
+    </p:extLst>
+  </p:cSld>
+  <p:clrMapOvr>
+    <a:masterClrMapping/>
+  </p:clrMapOvr>
+</p:sld>
+</file>
+
 <file path=ppt/slides/slide2.xml><?xml version="1.0" encoding="utf-8"?>
 <p:sld xmlns:a="http://schemas.openxmlformats.org/drawingml/2006/main" xmlns:r="http://schemas.openxmlformats.org/officeDocument/2006/relationships" xmlns:p="http://schemas.openxmlformats.org/presentationml/2006/main">
   <p:cSld>

</xml_diff>